<commit_message>
fixes and improvements for lec1 and lec2 (+hw fix)
</commit_message>
<xml_diff>
--- a/Lectures/Lecture1-b.pptx
+++ b/Lectures/Lecture1-b.pptx
@@ -279,7 +279,7 @@
           <a:p>
             <a:fld id="{CBA08D16-15DC-4E25-BDC3-F25146157B16}" type="datetimeFigureOut">
               <a:rPr lang="ru-RU" smtClean="0"/>
-              <a:t>10.09.2020</a:t>
+              <a:t>14.09.2020</a:t>
             </a:fld>
             <a:endParaRPr lang="ru-RU"/>
           </a:p>
@@ -678,7 +678,7 @@
           <a:p>
             <a:fld id="{FCEC8293-DB51-454A-BE81-EC8FCB31EBA2}" type="datetime1">
               <a:rPr lang="ru-RU" smtClean="0"/>
-              <a:t>10.09.2020</a:t>
+              <a:t>14.09.2020</a:t>
             </a:fld>
             <a:endParaRPr lang="ru-RU"/>
           </a:p>
@@ -852,7 +852,7 @@
           <a:p>
             <a:fld id="{241C87B1-1C35-4DBD-BC18-2BC72E776603}" type="datetime1">
               <a:rPr lang="ru-RU" smtClean="0"/>
-              <a:t>10.09.2020</a:t>
+              <a:t>14.09.2020</a:t>
             </a:fld>
             <a:endParaRPr lang="ru-RU"/>
           </a:p>
@@ -1036,7 +1036,7 @@
           <a:p>
             <a:fld id="{3134C275-26C0-42CD-9111-9ADE65922AF9}" type="datetime1">
               <a:rPr lang="ru-RU" smtClean="0"/>
-              <a:t>10.09.2020</a:t>
+              <a:t>14.09.2020</a:t>
             </a:fld>
             <a:endParaRPr lang="ru-RU"/>
           </a:p>
@@ -1210,7 +1210,7 @@
           <a:p>
             <a:fld id="{C1A9A50B-C350-45F5-8AAB-ADB9E670AF2E}" type="datetime1">
               <a:rPr lang="ru-RU" smtClean="0"/>
-              <a:t>10.09.2020</a:t>
+              <a:t>14.09.2020</a:t>
             </a:fld>
             <a:endParaRPr lang="ru-RU"/>
           </a:p>
@@ -1460,7 +1460,7 @@
           <a:p>
             <a:fld id="{089688C9-348F-42F9-B6C0-5990DDE0C5B2}" type="datetime1">
               <a:rPr lang="ru-RU" smtClean="0"/>
-              <a:t>10.09.2020</a:t>
+              <a:t>14.09.2020</a:t>
             </a:fld>
             <a:endParaRPr lang="ru-RU"/>
           </a:p>
@@ -1696,7 +1696,7 @@
           <a:p>
             <a:fld id="{684AFD8F-6DD9-4AD3-A505-FDC3F5C5F3F6}" type="datetime1">
               <a:rPr lang="ru-RU" smtClean="0"/>
-              <a:t>10.09.2020</a:t>
+              <a:t>14.09.2020</a:t>
             </a:fld>
             <a:endParaRPr lang="ru-RU"/>
           </a:p>
@@ -2067,7 +2067,7 @@
           <a:p>
             <a:fld id="{63551EFE-4D02-45EB-A747-8B6F047B5AA0}" type="datetime1">
               <a:rPr lang="ru-RU" smtClean="0"/>
-              <a:t>10.09.2020</a:t>
+              <a:t>14.09.2020</a:t>
             </a:fld>
             <a:endParaRPr lang="ru-RU"/>
           </a:p>
@@ -2189,7 +2189,7 @@
           <a:p>
             <a:fld id="{813A9F34-E5CD-4B8F-AA9E-889C84372B20}" type="datetime1">
               <a:rPr lang="ru-RU" smtClean="0"/>
-              <a:t>10.09.2020</a:t>
+              <a:t>14.09.2020</a:t>
             </a:fld>
             <a:endParaRPr lang="ru-RU"/>
           </a:p>
@@ -2288,7 +2288,7 @@
           <a:p>
             <a:fld id="{51224D22-9B29-44A6-8E82-95FC492DEDC1}" type="datetime1">
               <a:rPr lang="ru-RU" smtClean="0"/>
-              <a:t>10.09.2020</a:t>
+              <a:t>14.09.2020</a:t>
             </a:fld>
             <a:endParaRPr lang="ru-RU"/>
           </a:p>
@@ -2569,7 +2569,7 @@
           <a:p>
             <a:fld id="{91D1034F-4441-48A1-BDC0-25EA1022324A}" type="datetime1">
               <a:rPr lang="ru-RU" smtClean="0"/>
-              <a:t>10.09.2020</a:t>
+              <a:t>14.09.2020</a:t>
             </a:fld>
             <a:endParaRPr lang="ru-RU"/>
           </a:p>
@@ -2826,7 +2826,7 @@
           <a:p>
             <a:fld id="{B0FFDE79-B627-473B-AE17-4C65BD2495F7}" type="datetime1">
               <a:rPr lang="ru-RU" smtClean="0"/>
-              <a:t>10.09.2020</a:t>
+              <a:t>14.09.2020</a:t>
             </a:fld>
             <a:endParaRPr lang="ru-RU"/>
           </a:p>
@@ -3043,7 +3043,7 @@
           <a:p>
             <a:fld id="{11CA537A-1B8C-47BA-9BA6-7CE3FAFDA8BE}" type="datetime1">
               <a:rPr lang="ru-RU" smtClean="0"/>
-              <a:t>10.09.2020</a:t>
+              <a:t>14.09.2020</a:t>
             </a:fld>
             <a:endParaRPr lang="ru-RU"/>
           </a:p>
@@ -30112,8 +30112,8 @@
           </a:p>
         </p:txBody>
       </p:sp>
-      <mc:AlternateContent xmlns:mc="http://schemas.openxmlformats.org/markup-compatibility/2006">
-        <mc:Choice xmlns:a14="http://schemas.microsoft.com/office/drawing/2010/main" Requires="a14">
+      <mc:AlternateContent xmlns:mc="http://schemas.openxmlformats.org/markup-compatibility/2006" xmlns:a14="http://schemas.microsoft.com/office/drawing/2010/main">
+        <mc:Choice Requires="a14">
           <p:sp>
             <p:nvSpPr>
               <p:cNvPr id="3" name="Объект 2"/>
@@ -30914,7 +30914,7 @@
             </p:txBody>
           </p:sp>
         </mc:Choice>
-        <mc:Fallback>
+        <mc:Fallback xmlns="">
           <p:sp>
             <p:nvSpPr>
               <p:cNvPr id="3" name="Объект 2"/>
@@ -32118,8 +32118,8 @@
           </a:p>
         </p:txBody>
       </p:sp>
-      <mc:AlternateContent xmlns:mc="http://schemas.openxmlformats.org/markup-compatibility/2006" xmlns:a14="http://schemas.microsoft.com/office/drawing/2010/main">
-        <mc:Choice Requires="a14">
+      <mc:AlternateContent xmlns:mc="http://schemas.openxmlformats.org/markup-compatibility/2006">
+        <mc:Choice xmlns:a14="http://schemas.microsoft.com/office/drawing/2010/main" Requires="a14">
           <p:sp>
             <p:nvSpPr>
               <p:cNvPr id="3" name="Объект 2"/>
@@ -32260,26 +32260,17 @@
                 </a:r>
                 <a:r>
                   <a:rPr lang="ru-RU" dirty="0" smtClean="0"/>
-                  <a:t>– атакующий пытается угадать число </a:t>
-                </a:r>
-                <a14:m>
-                  <m:oMath xmlns:m="http://schemas.openxmlformats.org/officeDocument/2006/math">
-                    <m:r>
-                      <a:rPr lang="en-US" b="0" i="1" smtClean="0">
-                        <a:latin typeface="Cambria Math" panose="02040503050406030204" pitchFamily="18" charset="0"/>
-                      </a:rPr>
-                      <m:t>𝑏</m:t>
-                    </m:r>
-                  </m:oMath>
-                </a14:m>
-                <a:r>
-                  <a:rPr lang="en-US" dirty="0" smtClean="0"/>
-                  <a:t> (</a:t>
+                  <a:t>– атакующий пытается </a:t>
                 </a:r>
                 <a:r>
                   <a:rPr lang="ru-RU" dirty="0" smtClean="0"/>
-                  <a:t>угадать эксперимент)</a:t>
-                </a:r>
+                  <a:t>различить </a:t>
+                </a:r>
+                <a:r>
+                  <a:rPr lang="ru-RU" smtClean="0"/>
+                  <a:t>два эксперимента</a:t>
+                </a:r>
+                <a:endParaRPr lang="ru-RU" dirty="0" smtClean="0"/>
               </a:p>
               <a:p>
                 <a:r>
@@ -32351,7 +32342,7 @@
             </p:txBody>
           </p:sp>
         </mc:Choice>
-        <mc:Fallback xmlns="">
+        <mc:Fallback>
           <p:sp>
             <p:nvSpPr>
               <p:cNvPr id="3" name="Объект 2"/>

</xml_diff>

<commit_message>
lec 2 consistency with the book
</commit_message>
<xml_diff>
--- a/Lectures/Lecture1-b.pptx
+++ b/Lectures/Lecture1-b.pptx
@@ -279,7 +279,7 @@
           <a:p>
             <a:fld id="{CBA08D16-15DC-4E25-BDC3-F25146157B16}" type="datetimeFigureOut">
               <a:rPr lang="ru-RU" smtClean="0"/>
-              <a:t>09.09.2021</a:t>
+              <a:t>12.09.2021</a:t>
             </a:fld>
             <a:endParaRPr lang="ru-RU"/>
           </a:p>
@@ -678,7 +678,7 @@
           <a:p>
             <a:fld id="{FCEC8293-DB51-454A-BE81-EC8FCB31EBA2}" type="datetime1">
               <a:rPr lang="ru-RU" smtClean="0"/>
-              <a:t>09.09.2021</a:t>
+              <a:t>12.09.2021</a:t>
             </a:fld>
             <a:endParaRPr lang="ru-RU"/>
           </a:p>
@@ -852,7 +852,7 @@
           <a:p>
             <a:fld id="{241C87B1-1C35-4DBD-BC18-2BC72E776603}" type="datetime1">
               <a:rPr lang="ru-RU" smtClean="0"/>
-              <a:t>09.09.2021</a:t>
+              <a:t>12.09.2021</a:t>
             </a:fld>
             <a:endParaRPr lang="ru-RU"/>
           </a:p>
@@ -1036,7 +1036,7 @@
           <a:p>
             <a:fld id="{3134C275-26C0-42CD-9111-9ADE65922AF9}" type="datetime1">
               <a:rPr lang="ru-RU" smtClean="0"/>
-              <a:t>09.09.2021</a:t>
+              <a:t>12.09.2021</a:t>
             </a:fld>
             <a:endParaRPr lang="ru-RU"/>
           </a:p>
@@ -1210,7 +1210,7 @@
           <a:p>
             <a:fld id="{C1A9A50B-C350-45F5-8AAB-ADB9E670AF2E}" type="datetime1">
               <a:rPr lang="ru-RU" smtClean="0"/>
-              <a:t>09.09.2021</a:t>
+              <a:t>12.09.2021</a:t>
             </a:fld>
             <a:endParaRPr lang="ru-RU"/>
           </a:p>
@@ -1460,7 +1460,7 @@
           <a:p>
             <a:fld id="{089688C9-348F-42F9-B6C0-5990DDE0C5B2}" type="datetime1">
               <a:rPr lang="ru-RU" smtClean="0"/>
-              <a:t>09.09.2021</a:t>
+              <a:t>12.09.2021</a:t>
             </a:fld>
             <a:endParaRPr lang="ru-RU"/>
           </a:p>
@@ -1696,7 +1696,7 @@
           <a:p>
             <a:fld id="{684AFD8F-6DD9-4AD3-A505-FDC3F5C5F3F6}" type="datetime1">
               <a:rPr lang="ru-RU" smtClean="0"/>
-              <a:t>09.09.2021</a:t>
+              <a:t>12.09.2021</a:t>
             </a:fld>
             <a:endParaRPr lang="ru-RU"/>
           </a:p>
@@ -2067,7 +2067,7 @@
           <a:p>
             <a:fld id="{63551EFE-4D02-45EB-A747-8B6F047B5AA0}" type="datetime1">
               <a:rPr lang="ru-RU" smtClean="0"/>
-              <a:t>09.09.2021</a:t>
+              <a:t>12.09.2021</a:t>
             </a:fld>
             <a:endParaRPr lang="ru-RU"/>
           </a:p>
@@ -2189,7 +2189,7 @@
           <a:p>
             <a:fld id="{813A9F34-E5CD-4B8F-AA9E-889C84372B20}" type="datetime1">
               <a:rPr lang="ru-RU" smtClean="0"/>
-              <a:t>09.09.2021</a:t>
+              <a:t>12.09.2021</a:t>
             </a:fld>
             <a:endParaRPr lang="ru-RU"/>
           </a:p>
@@ -2288,7 +2288,7 @@
           <a:p>
             <a:fld id="{51224D22-9B29-44A6-8E82-95FC492DEDC1}" type="datetime1">
               <a:rPr lang="ru-RU" smtClean="0"/>
-              <a:t>09.09.2021</a:t>
+              <a:t>12.09.2021</a:t>
             </a:fld>
             <a:endParaRPr lang="ru-RU"/>
           </a:p>
@@ -2569,7 +2569,7 @@
           <a:p>
             <a:fld id="{91D1034F-4441-48A1-BDC0-25EA1022324A}" type="datetime1">
               <a:rPr lang="ru-RU" smtClean="0"/>
-              <a:t>09.09.2021</a:t>
+              <a:t>12.09.2021</a:t>
             </a:fld>
             <a:endParaRPr lang="ru-RU"/>
           </a:p>
@@ -2826,7 +2826,7 @@
           <a:p>
             <a:fld id="{B0FFDE79-B627-473B-AE17-4C65BD2495F7}" type="datetime1">
               <a:rPr lang="ru-RU" smtClean="0"/>
-              <a:t>09.09.2021</a:t>
+              <a:t>12.09.2021</a:t>
             </a:fld>
             <a:endParaRPr lang="ru-RU"/>
           </a:p>
@@ -3043,7 +3043,7 @@
           <a:p>
             <a:fld id="{11CA537A-1B8C-47BA-9BA6-7CE3FAFDA8BE}" type="datetime1">
               <a:rPr lang="ru-RU" smtClean="0"/>
-              <a:t>09.09.2021</a:t>
+              <a:t>12.09.2021</a:t>
             </a:fld>
             <a:endParaRPr lang="ru-RU"/>
           </a:p>
@@ -17963,8 +17963,8 @@
           </a:p>
         </p:txBody>
       </p:sp>
-      <mc:AlternateContent xmlns:mc="http://schemas.openxmlformats.org/markup-compatibility/2006" xmlns:a14="http://schemas.microsoft.com/office/drawing/2010/main">
-        <mc:Choice Requires="a14">
+      <mc:AlternateContent xmlns:mc="http://schemas.openxmlformats.org/markup-compatibility/2006">
+        <mc:Choice xmlns:a14="http://schemas.microsoft.com/office/drawing/2010/main" Requires="a14">
           <p:sp>
             <p:nvSpPr>
               <p:cNvPr id="3" name="Объект 2"/>
@@ -18146,7 +18146,15 @@
                 </a14:m>
                 <a:r>
                   <a:rPr lang="ru-RU" dirty="0" smtClean="0"/>
-                  <a:t> генерирует два сообщения </a:t>
+                  <a:t> генерирует </a:t>
+                </a:r>
+                <a:r>
+                  <a:rPr lang="ru-RU" smtClean="0"/>
+                  <a:t>два </a:t>
+                </a:r>
+                <a:r>
+                  <a:rPr lang="ru-RU" smtClean="0"/>
+                  <a:t>случайных сообщения </a:t>
                 </a:r>
                 <a14:m>
                   <m:oMath xmlns:m="http://schemas.openxmlformats.org/officeDocument/2006/math">
@@ -18443,7 +18451,7 @@
             </p:txBody>
           </p:sp>
         </mc:Choice>
-        <mc:Fallback xmlns="">
+        <mc:Fallback>
           <p:sp>
             <p:nvSpPr>
               <p:cNvPr id="3" name="Объект 2"/>
@@ -18458,7 +18466,7 @@
               <a:blipFill>
                 <a:blip r:embed="rId2"/>
                 <a:stretch>
-                  <a:fillRect l="-1043" t="-2101" r="-406"/>
+                  <a:fillRect l="-1043" t="-2101" r="-754"/>
                 </a:stretch>
               </a:blipFill>
             </p:spPr>
@@ -19702,10 +19710,10 @@
         </p:nvGrpSpPr>
         <p:grpSpPr bwMode="auto">
           <a:xfrm>
-            <a:off x="5948378" y="5151447"/>
-            <a:ext cx="1237559" cy="815513"/>
+            <a:off x="5948376" y="5151447"/>
+            <a:ext cx="1337132" cy="815513"/>
             <a:chOff x="3216" y="3483"/>
-            <a:chExt cx="1392" cy="501"/>
+            <a:chExt cx="1504" cy="501"/>
           </a:xfrm>
         </p:grpSpPr>
         <p:sp>
@@ -19791,7 +19799,7 @@
               <p:spPr bwMode="auto">
                 <a:xfrm>
                   <a:off x="3400" y="3483"/>
-                  <a:ext cx="958" cy="310"/>
+                  <a:ext cx="1320" cy="227"/>
                 </a:xfrm>
                 <a:prstGeom prst="rect">
                   <a:avLst/>
@@ -19867,10 +19875,10 @@
                           </m:e>
                           <m:sub>
                             <m:r>
-                              <a:rPr lang="en-US" b="0" i="1" smtClean="0">
+                              <a:rPr lang="ru-RU" b="0" i="1" smtClean="0">
                                 <a:latin typeface="Cambria Math" panose="02040503050406030204" pitchFamily="18" charset="0"/>
                               </a:rPr>
-                              <m:t>0</m:t>
+                              <m:t>1</m:t>
                             </m:r>
                           </m:sub>
                         </m:sSub>
@@ -19894,7 +19902,7 @@
               <p:spPr bwMode="auto">
                 <a:xfrm>
                   <a:off x="3400" y="3483"/>
-                  <a:ext cx="958" cy="310"/>
+                  <a:ext cx="1320" cy="227"/>
                 </a:xfrm>
                 <a:prstGeom prst="rect">
                   <a:avLst/>
@@ -19902,7 +19910,7 @@
                 <a:blipFill>
                   <a:blip r:embed="rId7"/>
                   <a:stretch>
-                    <a:fillRect r="-26619"/>
+                    <a:fillRect/>
                   </a:stretch>
                 </a:blipFill>
                 <a:ln w="9525">
@@ -20867,7 +20875,7 @@
             <p:spPr/>
             <p:txBody>
               <a:bodyPr>
-                <a:normAutofit/>
+                <a:normAutofit lnSpcReduction="10000"/>
               </a:bodyPr>
               <a:lstStyle/>
               <a:p>
@@ -21353,10 +21361,10 @@
                       </m:e>
                       <m:sub>
                         <m:r>
-                          <a:rPr lang="en-US" b="0" i="1" smtClean="0">
-                            <a:latin typeface="Cambria Math" panose="02040503050406030204" pitchFamily="18" charset="0"/>
-                          </a:rPr>
-                          <m:t>0</m:t>
+                          <a:rPr lang="ru-RU" b="0" i="1" smtClean="0">
+                            <a:latin typeface="Cambria Math" panose="02040503050406030204" pitchFamily="18" charset="0"/>
+                          </a:rPr>
+                          <m:t>1</m:t>
                         </m:r>
                       </m:sub>
                     </m:sSub>
@@ -21426,6 +21434,76 @@
                       </m:e>
                       <m:sub>
                         <m:r>
+                          <a:rPr lang="ru-RU" b="0" i="1" smtClean="0">
+                            <a:latin typeface="Cambria Math" panose="02040503050406030204" pitchFamily="18" charset="0"/>
+                          </a:rPr>
+                          <m:t>0</m:t>
+                        </m:r>
+                      </m:sub>
+                    </m:sSub>
+                  </m:oMath>
+                </a14:m>
+                <a:r>
+                  <a:rPr lang="ru-RU" dirty="0" smtClean="0"/>
+                  <a:t>, то</a:t>
+                </a:r>
+                <a:r>
+                  <a:rPr lang="en-US" dirty="0" smtClean="0"/>
+                  <a:t> </a:t>
+                </a:r>
+                <a14:m>
+                  <m:oMath xmlns:m="http://schemas.openxmlformats.org/officeDocument/2006/math">
+                    <m:sSub>
+                      <m:sSubPr>
+                        <m:ctrlPr>
+                          <a:rPr lang="en-US" b="0" i="1" smtClean="0">
+                            <a:latin typeface="Cambria Math" panose="02040503050406030204" pitchFamily="18" charset="0"/>
+                          </a:rPr>
+                        </m:ctrlPr>
+                      </m:sSubPr>
+                      <m:e>
+                        <m:r>
+                          <a:rPr lang="en-US" b="0" i="1" smtClean="0">
+                            <a:latin typeface="Cambria Math" panose="02040503050406030204" pitchFamily="18" charset="0"/>
+                          </a:rPr>
+                          <m:t>𝑝</m:t>
+                        </m:r>
+                      </m:e>
+                      <m:sub>
+                        <m:r>
+                          <a:rPr lang="en-US" b="0" i="1" smtClean="0">
+                            <a:latin typeface="Cambria Math" panose="02040503050406030204" pitchFamily="18" charset="0"/>
+                          </a:rPr>
+                          <m:t>0</m:t>
+                        </m:r>
+                      </m:sub>
+                    </m:sSub>
+                  </m:oMath>
+                </a14:m>
+                <a:r>
+                  <a:rPr lang="ru-RU" dirty="0" smtClean="0"/>
+                  <a:t> не зависит от </a:t>
+                </a:r>
+                <a14:m>
+                  <m:oMath xmlns:m="http://schemas.openxmlformats.org/officeDocument/2006/math">
+                    <m:sSub>
+                      <m:sSubPr>
+                        <m:ctrlPr>
+                          <a:rPr lang="en-US" b="0" i="1" smtClean="0">
+                            <a:latin typeface="Cambria Math" panose="02040503050406030204" pitchFamily="18" charset="0"/>
+                          </a:rPr>
+                        </m:ctrlPr>
+                      </m:sSubPr>
+                      <m:e>
+                        <m:r>
+                          <a:rPr lang="en-US" b="0" i="1" smtClean="0">
+                            <a:latin typeface="Cambria Math" panose="02040503050406030204" pitchFamily="18" charset="0"/>
+                          </a:rPr>
+                          <m:t>𝑚</m:t>
+                        </m:r>
+                      </m:e>
+                      <m:sub>
+                        <m:r>
                           <a:rPr lang="en-US" b="0" i="1" smtClean="0">
                             <a:latin typeface="Cambria Math" panose="02040503050406030204" pitchFamily="18" charset="0"/>
                           </a:rPr>
@@ -21436,8 +21514,12 @@
                   </m:oMath>
                 </a14:m>
                 <a:r>
+                  <a:rPr lang="en-US" dirty="0" smtClean="0"/>
+                  <a:t> </a:t>
+                </a:r>
+                <a:r>
                   <a:rPr lang="ru-RU" dirty="0" smtClean="0"/>
-                  <a:t>, то </a:t>
+                  <a:t>и </a:t>
                 </a:r>
                 <a14:m>
                   <m:oMath xmlns:m="http://schemas.openxmlformats.org/officeDocument/2006/math">
@@ -21459,15 +21541,61 @@
                       </m:e>
                       <m:sub>
                         <m:r>
-                          <a:rPr lang="en-US" b="0" i="1" smtClean="0">
-                            <a:latin typeface="Cambria Math" panose="02040503050406030204" pitchFamily="18" charset="0"/>
-                          </a:rPr>
-                          <m:t>1</m:t>
+                          <a:rPr lang="ru-RU" b="0" i="1" smtClean="0">
+                            <a:latin typeface="Cambria Math" panose="02040503050406030204" pitchFamily="18" charset="0"/>
+                          </a:rPr>
+                          <m:t>0</m:t>
                         </m:r>
                       </m:sub>
                     </m:sSub>
                     <m:r>
                       <a:rPr lang="en-US" b="0" i="0" smtClean="0">
+                        <a:latin typeface="Cambria Math" panose="02040503050406030204" pitchFamily="18" charset="0"/>
+                      </a:rPr>
+                      <m:t>=</m:t>
+                    </m:r>
+                    <m:r>
+                      <m:rPr>
+                        <m:sty m:val="p"/>
+                      </m:rPr>
+                      <a:rPr lang="en-US" b="0" i="0" smtClean="0">
+                        <a:latin typeface="Cambria Math" panose="02040503050406030204" pitchFamily="18" charset="0"/>
+                      </a:rPr>
+                      <m:t>Pr</m:t>
+                    </m:r>
+                    <m:r>
+                      <a:rPr lang="en-US" b="0" i="1" smtClean="0">
+                        <a:latin typeface="Cambria Math" panose="02040503050406030204" pitchFamily="18" charset="0"/>
+                      </a:rPr>
+                      <m:t>⁡[</m:t>
+                    </m:r>
+                    <m:sSup>
+                      <m:sSupPr>
+                        <m:ctrlPr>
+                          <a:rPr lang="en-US" b="0" i="1" smtClean="0">
+                            <a:latin typeface="Cambria Math" panose="02040503050406030204" pitchFamily="18" charset="0"/>
+                          </a:rPr>
+                        </m:ctrlPr>
+                      </m:sSupPr>
+                      <m:e>
+                        <m:r>
+                          <a:rPr lang="en-US" b="0" i="1" smtClean="0">
+                            <a:latin typeface="Cambria Math" panose="02040503050406030204" pitchFamily="18" charset="0"/>
+                          </a:rPr>
+                          <m:t>𝑚</m:t>
+                        </m:r>
+                      </m:e>
+                      <m:sup>
+                        <m:r>
+                          <a:rPr lang="en-US" b="0" i="1" smtClean="0">
+                            <a:latin typeface="Cambria Math" panose="02040503050406030204" pitchFamily="18" charset="0"/>
+                          </a:rPr>
+                          <m:t>′</m:t>
+                        </m:r>
+                      </m:sup>
+                    </m:sSup>
+                    <m:r>
+                      <a:rPr lang="en-US" b="0" i="1" smtClean="0">
                         <a:latin typeface="Cambria Math" panose="02040503050406030204" pitchFamily="18" charset="0"/>
                       </a:rPr>
                       <m:t>=</m:t>
@@ -21481,21 +21609,6 @@
                         </m:ctrlPr>
                       </m:sSubPr>
                       <m:e>
-                        <m:r>
-                          <m:rPr>
-                            <m:sty m:val="p"/>
-                          </m:rPr>
-                          <a:rPr lang="en-US" b="0" i="0" smtClean="0">
-                            <a:latin typeface="Cambria Math" panose="02040503050406030204" pitchFamily="18" charset="0"/>
-                          </a:rPr>
-                          <m:t>Pr</m:t>
-                        </m:r>
-                        <m:r>
-                          <a:rPr lang="en-US" b="0" i="1" smtClean="0">
-                            <a:latin typeface="Cambria Math" panose="02040503050406030204" pitchFamily="18" charset="0"/>
-                          </a:rPr>
-                          <m:t>⁡[</m:t>
-                        </m:r>
                         <m:r>
                           <a:rPr lang="en-US" b="0" i="1" smtClean="0">
                             <a:latin typeface="Cambria Math" panose="02040503050406030204" pitchFamily="18" charset="0"/>
@@ -21516,19 +21629,7 @@
                       <a:rPr lang="en-US" b="0" i="1" smtClean="0">
                         <a:latin typeface="Cambria Math" panose="02040503050406030204" pitchFamily="18" charset="0"/>
                       </a:rPr>
-                      <m:t>=</m:t>
-                    </m:r>
-                    <m:r>
-                      <a:rPr lang="en-US" b="0" i="1" smtClean="0">
-                        <a:latin typeface="Cambria Math" panose="02040503050406030204" pitchFamily="18" charset="0"/>
-                      </a:rPr>
-                      <m:t>𝑚</m:t>
-                    </m:r>
-                    <m:r>
-                      <a:rPr lang="en-US" b="0" i="1" smtClean="0">
-                        <a:latin typeface="Cambria Math" panose="02040503050406030204" pitchFamily="18" charset="0"/>
-                      </a:rPr>
-                      <m:t>′]=1/|</m:t>
+                      <m:t>]=1/|</m:t>
                     </m:r>
                     <m:r>
                       <a:rPr lang="en-US" b="0" i="1" smtClean="0">
@@ -21864,7 +21965,7 @@
               <a:blipFill>
                 <a:blip r:embed="rId2"/>
                 <a:stretch>
-                  <a:fillRect l="-1043" t="-2101" r="-1275" b="-1961"/>
+                  <a:fillRect l="-1043" t="-2801" r="-1275" b="-1120"/>
                 </a:stretch>
               </a:blipFill>
             </p:spPr>
@@ -21989,8 +22090,8 @@
           </a:p>
         </p:txBody>
       </p:sp>
-      <mc:AlternateContent xmlns:mc="http://schemas.openxmlformats.org/markup-compatibility/2006">
-        <mc:Choice xmlns:a14="http://schemas.microsoft.com/office/drawing/2010/main" Requires="a14">
+      <mc:AlternateContent xmlns:mc="http://schemas.openxmlformats.org/markup-compatibility/2006" xmlns:a14="http://schemas.microsoft.com/office/drawing/2010/main">
+        <mc:Choice Requires="a14">
           <p:sp>
             <p:nvSpPr>
               <p:cNvPr id="3" name="Объект 2"/>
@@ -22226,11 +22327,7 @@
                 </a:r>
                 <a:r>
                   <a:rPr lang="ru-RU" dirty="0" smtClean="0"/>
-                  <a:t>тексте (Например </a:t>
-                </a:r>
-                <a:r>
-                  <a:rPr lang="ru-RU" dirty="0" smtClean="0"/>
-                  <a:t>функция вычисления чётности сообщения </a:t>
+                  <a:t>тексте (Например функция вычисления чётности сообщения </a:t>
                 </a:r>
                 <a14:m>
                   <m:oMath xmlns:m="http://schemas.openxmlformats.org/officeDocument/2006/math">
@@ -22813,7 +22910,7 @@
             </p:txBody>
           </p:sp>
         </mc:Choice>
-        <mc:Fallback>
+        <mc:Fallback xmlns="">
           <p:sp>
             <p:nvSpPr>
               <p:cNvPr id="3" name="Объект 2"/>
@@ -26718,8 +26815,8 @@
           </a:p>
         </p:txBody>
       </p:sp>
-      <mc:AlternateContent xmlns:mc="http://schemas.openxmlformats.org/markup-compatibility/2006">
-        <mc:Choice xmlns:a14="http://schemas.microsoft.com/office/drawing/2010/main" Requires="a14">
+      <mc:AlternateContent xmlns:mc="http://schemas.openxmlformats.org/markup-compatibility/2006" xmlns:a14="http://schemas.microsoft.com/office/drawing/2010/main">
+        <mc:Choice Requires="a14">
           <p:sp>
             <p:nvSpPr>
               <p:cNvPr id="3" name="Объект 2"/>
@@ -27656,7 +27753,7 @@
             </p:txBody>
           </p:sp>
         </mc:Choice>
-        <mc:Fallback>
+        <mc:Fallback xmlns="">
           <p:sp>
             <p:nvSpPr>
               <p:cNvPr id="3" name="Объект 2"/>

</xml_diff>